<commit_message>
feat: Add PPTX E2E test procedures and enhance execution flow with output type handling
</commit_message>
<xml_diff>
--- a/app/src/test/resources/skills/pptx/langchain4j_presentation.pptx
+++ b/app/src/test/resources/skills/pptx/langchain4j_presentation.pptx
@@ -504,7 +504,37 @@
           <a:p>
             <a:r>
               <a:rPr lang="en-US" dirty="0"/>
-              <a:t/>
+              <a:t>【スライド1: LangChain4jの概要】
+＜イントロダクション - 2分＞
+皆さん、こんにちは。本日は、JavaアプリケーションにAI機能を統合するための強力なフレームワーク、LangChain4jについてご紹介します。
+＜現状の課題 - 1分＞
+多くのJava開発者の方が、ChatGPTやClaudeなどのLLMをアプリケーションに組み込みたいと考えていますが、以下の課題に直面しています：
+• Pythonベースのツールが多く、Javaエコシステムとの統合が困難
+• 各AIプロバイダーのAPIが異なり、学習コストが高い
+• エンタープライズ要件（セキュリティ、監査、スケーラビリティ）への対応が複雑
+＜LangChain4jとは - 2分＞
+LangChain4jは、これらの課題を解決するJava専用のLLMフレームワークです。
+• PythonのLangChainの設計思想を継承しつつ、Java開発者のための最適化を実施
+• 「Write once, run with any LLM」- 一度書けば、どのLLMでも動作
+＜3つの主要特徴の説明 - 3分＞
+1. 簡単な統合
+   「既存のSpring BootアプリケーションにChatGPT機能を追加するのに、わずか10行のコードで実現できます」
+   実例：カスタマーサポートチャットボット、コード生成ツール
+2. チェーン構築
+   「複数のAI処理を連結し、高度なワークフローを構築できます」
+   実例：文書要約→感情分析→返信生成のような複合処理
+3. Java最適化
+   「StreamやOptional、アノテーションベースの設定など、Javaらしい実装が可能」
+   Spring開発者なら違和感なく使い始められます
+＜バージョン情報 - 30秒＞
+• Java 8以上で動作（レガシーシステムでも導入可能）
+• 活発な開発（月1-2回のリリース）
+• Apache License 2.0（商用利用も安心）
+＜想定される質問と回答＞
+Q: 「Pythonのライブラリを使う方が良いのでは？」
+A: 「既存のJavaインフラ、CI/CD、監視ツールをそのまま活用できる点が大きなメリットです。チーム全体がJavaに精通している場合、学習コストも最小限です。」
+Q: 「パフォーマンスはどうですか？」
+A: 「JVMの最適化により、特に大規模バッチ処理では優れたパフォーマンスを発揮します。」</a:t>
             </a:r>
             <a:endParaRPr lang="en-US" dirty="0"/>
           </a:p>
@@ -592,7 +622,65 @@
           <a:p>
             <a:r>
               <a:rPr lang="en-US" dirty="0"/>
-              <a:t/>
+              <a:t>【スライド2: コンポーネントとアーキテクチャ】
+＜スライド切り替え - 30秒＞
+「それでは、LangChain4jの技術的な構成について、詳しく見ていきましょう。」
+＜主要コンポーネントの説明 - 5分＞
+1. Language Models（言語モデル）- 1分30秒
+   「LangChain4jの心臓部です。複数のAIプロバイダーを統一インターフェースで扱えます」
+   対応プロバイダー：
+   • OpenAI (GPT-4, GPT-3.5)
+   • Anthropic (Claude)
+   • Azure OpenAI Service
+   • Google Vertex AI
+   • Hugging Face
+   • Ollama（ローカルLLM）
+   実装例：「プロバイダーを変更する際も、設定ファイルを1行変更するだけです」
+   コスト最適化：「開発環境ではGPT-3.5、本番ではGPT-4といった使い分けが簡単」
+2. Embeddings &amp; Vector Store - 1分30秒
+   「RAG（Retrieval-Augmented Generation）を実現するための重要なコンポーネントです」
+   使用シナリオ：
+   • 社内文書検索システム
+   • FAQチャットボット
+   • コードベースの類似検索
+   対応ベクトルDB：
+   • インメモリ（開発用）
+   • ChromaDB、Pinecone（クラウド）
+   • Elasticsearch（既存インフラ活用）
+   「10万件の文書でも、ミリ秒単位で関連情報を検索できます」
+3. Document Processing - 1分
+   「様々な形式のドキュメントをAIが理解できる形に変換します」
+   対応フォーマット：
+   • PDF（契約書、マニュアル）
+   • Word、Excel（業務文書）
+   • HTML（Webコンテンツ）
+   • テキストファイル（ログ、設定ファイル）
+   「PDFの表も正確に抽出し、構造を保持したまま処理できます」
+4. Chains &amp; Memory - 1分
+   「複数の処理を連結し、文脈を保持した対話を実現します」
+   メモリタイプ：
+   • ConversationBufferMemory（全履歴保持）
+   • ConversationSummaryMemory（要約保持）
+   • ConversationWindowMemory（直近N件）
+   「カスタマーサポートでは、過去の会話を参照しながら適切な回答が可能」
+＜アーキテクチャ階層の説明 - 2分＞
+「4層構造により、関心の分離と拡張性を実現しています」
+• アプリケーション層
+  「ビジネスロジックとUIを実装。REST API、WebSocketでの公開も容易」
+• コア層
+  「フレームワークの中核。プロンプトテンプレート、チェーン実行エンジンなど」
+• プロバイダー層
+  「各AIサービスとの接続。新しいプロバイダーの追加も簡単」
+• インフラストラクチャー層
+  「永続化、キャッシング、監視などの横断的関心事」
+＜実装のポイント - 1分＞
+「Spring Bootを使用している場合、@Configurationクラスでの設定だけで開始できます」
+「既存のDIコンテナ、トランザクション管理、セキュリティ設定をそのまま活用可能」
+＜想定される質問と回答＞
+Q: 「ベクトルストアの選定基準は？」
+A: 「データ量、レイテンシ要件、既存インフラを考慮。開発はインメモリ、本番はマネージドサービスを推奨」
+Q: 「メモリ使用量が心配です」
+A: 「ConversationWindowMemoryやSummaryMemoryで制御可能。Redisでの外部化も対応」</a:t>
             </a:r>
             <a:endParaRPr lang="en-US" dirty="0"/>
           </a:p>
@@ -680,7 +768,93 @@
           <a:p>
             <a:r>
               <a:rPr lang="en-US" dirty="0"/>
-              <a:t/>
+              <a:t>【スライド3: 使用方法とメリット】
+＜導入 - 30秒＞
+「最後に、実際のコード例とビジネス価値についてご説明します。」
+＜コード例の詳細解説 - 4分＞
+1. セットアップ（1分）
+   「Maven依存関係を追加するだけで始められます」
+   依存関係の説明：
+   • langchain4j-core: 基本機能
+   • langchain4j-open-ai: OpenAI連携（必要に応じて選択）
+   • langchain4j-spring-boot-starter: Spring Boot統合
+   「既存プロジェクトへの影響は最小限。JARサイズも約2MB程度」
+2. 初期化コード（1分30秒）
+   ChatLanguageModel model = OpenAiChatModel.builder()
+       .apiKey(System.getenv("OPENAI_API_KEY"))
+       .modelName(OpenAiModelName.GPT_4)
+       .temperature(0.7)
+       .build();
+   ポイント説明：
+   • 「APIキーは環境変数から読み込み（セキュリティベストプラクティス）」
+   • 「temperatureパラメータで創造性を調整（0.0=決定的、1.0=創造的）」
+   • 「タイムアウト、リトライ、プロキシ設定も可能」
+3. 実行例（1分30秒）
+   String response = model.generate("JavaでFizzBuzzを実装してください");
+   「たった1行で、自然言語での指示をコードに変換できます」
+   高度な使用例：
+   • ストリーミング: model.generateStream()でリアルタイム応答
+   • 関数呼び出し: 外部APIとの連携
+   • プロンプトテンプレート: 再利用可能な質問形式
+＜ビジネスメリットの詳細 - 5分＞
+1. 開発速度向上（1分30秒）
+   「実際の導入事例では、開発工数を30-50%削減」
+   具体例：
+   • チャットボット開発: 3ヶ月→1ヶ月
+   • ドキュメント検索システム: 2ヶ月→3週間
+   • コードレビューツール: 6週間→2週間
+   「ボイラープレートコードが不要。ビジネスロジックに集中できます」
+2. プロバイダー非依存（1分30秒）
+   「将来の技術変化にも柔軟に対応」
+   切り替えシナリオ：
+   • コスト削減: OpenAI→Claude（50%コスト削減の事例）
+   • パフォーマンス: GPT-3.5→GPT-4（精度向上）
+   • コンプライアンス: クラウド→オンプレミス
+   「設定ファイルの変更だけで、コードの修正は不要」
+3. エンタープライズ対応（2分）
+   「大企業の厳格な要件にも対応」
+   セキュリティ機能：
+   • Spring Security統合（認証・認可）
+   • APIキーの暗号化管理
+   • プロンプトインジェクション対策
+   監査・コンプライアンス：
+   • 全リクエスト/レスポンスのロギング
+   • GDPR対応（個人情報のマスキング）
+   • SOC2準拠のための監査証跡
+   スケーラビリティ：
+   • 非同期処理対応
+   • コネクションプーリング
+   • 分散キャッシング（Redis統合）
+＜活用事例 - 2分＞
+「実際の導入企業での成功事例をご紹介します」
+1. 金融機関A社
+   「コンプライアンス文書の自動チェックシステム」
+   • 処理時間: 90%削減
+   • 精度: 人間のチェックと同等以上
+2. Eコマース企業B社
+   「商品説明の自動生成」
+   • 月間10万商品の説明文を自動作成
+   • SEOスコア: 平均30%向上
+3. SaaS企業C社
+   「カスタマーサポートの自動化」
+   • 問い合わせの70%を自動解決
+   • 顧客満足度: 15%向上
+＜実装のベストプラクティス - 1分＞
+• エラーハンドリング: Circuit Breakerパターンの実装
+• コスト管理: トークン使用量の監視とアラート
+• プロンプト管理: バージョン管理とA/Bテスト
+• キャッシング: 同一質問への応答をキャッシュ
+＜想定される質問と回答＞
+Q: 「導入にあたっての最初のステップは？」
+A: 「まず小さなPoCから始めることを推奨。社内FAQボットなど、リスクの低い領域から導入し、段階的に拡大」
+Q: 「運用コストはどの程度？」
+A: 「月間100万リクエストで約$500-1000。キャッシングとプロンプト最適化でさらに削減可能」
+Q: 「社内データの学習は可能？」
+A: 「RAGパターンで社内文書を参照可能。Fine-tuningも対応予定」
+＜クロージング - 30秒＞
+「LangChain4jは、Javaエコシステムに最適化された実用的なLLMフレームワークです。
+ぜひ、小さなプロジェクトから始めて、その威力を実感してください。
+ご質問があれば、お気軽にお聞きください。」</a:t>
             </a:r>
             <a:endParaRPr lang="en-US" dirty="0"/>
           </a:p>
@@ -1145,7 +1319,7 @@
       </p:sp>
       <p:pic>
         <p:nvPicPr>
-          <p:cNvPr id="4" name="Image 0" descr="/tmp/rasterized-gradient-9e4c9483.png">    </p:cNvPr>
+          <p:cNvPr id="4" name="Image 0" descr="/tmp/rasterized-gradient-0bd548ff.png">    </p:cNvPr>
           <p:cNvPicPr>
             <a:picLocks noChangeAspect="1"/>
           </p:cNvPicPr>
@@ -2615,7 +2789,7 @@
       </p:sp>
       <p:pic>
         <p:nvPicPr>
-          <p:cNvPr id="22" name="Image 0" descr="/tmp/rasterized-gradient-58529e3d.png">    </p:cNvPr>
+          <p:cNvPr id="22" name="Image 0" descr="/tmp/rasterized-gradient-cf4f7bce.png">    </p:cNvPr>
           <p:cNvPicPr>
             <a:picLocks noChangeAspect="1"/>
           </p:cNvPicPr>
@@ -4587,7 +4761,7 @@
       </p:sp>
       <p:pic>
         <p:nvPicPr>
-          <p:cNvPr id="32" name="Image 0" descr="/tmp/rasterized-gradient-571d11d6.png">    </p:cNvPr>
+          <p:cNvPr id="32" name="Image 0" descr="/tmp/rasterized-gradient-20f94e08.png">    </p:cNvPr>
           <p:cNvPicPr>
             <a:picLocks noChangeAspect="1"/>
           </p:cNvPicPr>

</xml_diff>